<commit_message>
update word_counter.R and finish info-practice
</commit_message>
<xml_diff>
--- a/info/InfoPractice.pptx
+++ b/info/InfoPractice.pptx
@@ -300,7 +300,7 @@
           <a:p>
             <a:fld id="{E90ED720-0104-4369-84BC-D37694168613}" type="datetimeFigureOut">
               <a:rPr kumimoji="1" lang="ja-JP" altLang="en-US" smtClean="0"/>
-              <a:t>2015/8/13</a:t>
+              <a:t>2015/8/14</a:t>
             </a:fld>
             <a:endParaRPr kumimoji="1" lang="ja-JP" altLang="en-US"/>
           </a:p>
@@ -532,7 +532,7 @@
           <a:p>
             <a:fld id="{E90ED720-0104-4369-84BC-D37694168613}" type="datetimeFigureOut">
               <a:rPr kumimoji="1" lang="ja-JP" altLang="en-US" smtClean="0"/>
-              <a:t>2015/8/13</a:t>
+              <a:t>2015/8/14</a:t>
             </a:fld>
             <a:endParaRPr kumimoji="1" lang="ja-JP" altLang="en-US"/>
           </a:p>
@@ -739,7 +739,7 @@
           <a:p>
             <a:fld id="{E90ED720-0104-4369-84BC-D37694168613}" type="datetimeFigureOut">
               <a:rPr kumimoji="1" lang="ja-JP" altLang="en-US" smtClean="0"/>
-              <a:t>2015/8/13</a:t>
+              <a:t>2015/8/14</a:t>
             </a:fld>
             <a:endParaRPr kumimoji="1" lang="ja-JP" altLang="en-US"/>
           </a:p>
@@ -936,7 +936,7 @@
           <a:p>
             <a:fld id="{E90ED720-0104-4369-84BC-D37694168613}" type="datetimeFigureOut">
               <a:rPr kumimoji="1" lang="ja-JP" altLang="en-US" smtClean="0"/>
-              <a:t>2015/8/13</a:t>
+              <a:t>2015/8/14</a:t>
             </a:fld>
             <a:endParaRPr kumimoji="1" lang="ja-JP" altLang="en-US"/>
           </a:p>
@@ -1184,7 +1184,7 @@
           <a:p>
             <a:fld id="{E90ED720-0104-4369-84BC-D37694168613}" type="datetimeFigureOut">
               <a:rPr kumimoji="1" lang="ja-JP" altLang="en-US" smtClean="0"/>
-              <a:t>2015/8/13</a:t>
+              <a:t>2015/8/14</a:t>
             </a:fld>
             <a:endParaRPr kumimoji="1" lang="ja-JP" altLang="en-US"/>
           </a:p>
@@ -1566,7 +1566,7 @@
           <a:p>
             <a:fld id="{E90ED720-0104-4369-84BC-D37694168613}" type="datetimeFigureOut">
               <a:rPr kumimoji="1" lang="ja-JP" altLang="en-US" smtClean="0"/>
-              <a:t>2015/8/13</a:t>
+              <a:t>2015/8/14</a:t>
             </a:fld>
             <a:endParaRPr kumimoji="1" lang="ja-JP" altLang="en-US"/>
           </a:p>
@@ -2096,7 +2096,7 @@
           <a:p>
             <a:fld id="{E90ED720-0104-4369-84BC-D37694168613}" type="datetimeFigureOut">
               <a:rPr kumimoji="1" lang="ja-JP" altLang="en-US" smtClean="0"/>
-              <a:t>2015/8/13</a:t>
+              <a:t>2015/8/14</a:t>
             </a:fld>
             <a:endParaRPr kumimoji="1" lang="ja-JP" altLang="en-US"/>
           </a:p>
@@ -2244,7 +2244,7 @@
           <a:p>
             <a:fld id="{E90ED720-0104-4369-84BC-D37694168613}" type="datetimeFigureOut">
               <a:rPr kumimoji="1" lang="ja-JP" altLang="en-US" smtClean="0"/>
-              <a:t>2015/8/13</a:t>
+              <a:t>2015/8/14</a:t>
             </a:fld>
             <a:endParaRPr kumimoji="1" lang="ja-JP" altLang="en-US"/>
           </a:p>
@@ -2334,7 +2334,7 @@
           <a:p>
             <a:fld id="{E90ED720-0104-4369-84BC-D37694168613}" type="datetimeFigureOut">
               <a:rPr kumimoji="1" lang="ja-JP" altLang="en-US" smtClean="0"/>
-              <a:t>2015/8/13</a:t>
+              <a:t>2015/8/14</a:t>
             </a:fld>
             <a:endParaRPr kumimoji="1" lang="ja-JP" altLang="en-US"/>
           </a:p>
@@ -2640,7 +2640,7 @@
           <a:p>
             <a:fld id="{E90ED720-0104-4369-84BC-D37694168613}" type="datetimeFigureOut">
               <a:rPr kumimoji="1" lang="ja-JP" altLang="en-US" smtClean="0"/>
-              <a:t>2015/8/13</a:t>
+              <a:t>2015/8/14</a:t>
             </a:fld>
             <a:endParaRPr kumimoji="1" lang="ja-JP" altLang="en-US"/>
           </a:p>
@@ -2945,7 +2945,7 @@
           <a:p>
             <a:fld id="{E90ED720-0104-4369-84BC-D37694168613}" type="datetimeFigureOut">
               <a:rPr kumimoji="1" lang="ja-JP" altLang="en-US" smtClean="0"/>
-              <a:t>2015/8/13</a:t>
+              <a:t>2015/8/14</a:t>
             </a:fld>
             <a:endParaRPr kumimoji="1" lang="ja-JP" altLang="en-US"/>
           </a:p>
@@ -3275,7 +3275,7 @@
           <a:p>
             <a:fld id="{E90ED720-0104-4369-84BC-D37694168613}" type="datetimeFigureOut">
               <a:rPr kumimoji="1" lang="ja-JP" altLang="en-US" smtClean="0"/>
-              <a:t>2015/8/13</a:t>
+              <a:t>2015/8/14</a:t>
             </a:fld>
             <a:endParaRPr kumimoji="1" lang="ja-JP" altLang="en-US"/>
           </a:p>
@@ -4572,6 +4572,112 @@
           </a:p>
         </p:txBody>
       </p:sp>
+      <p:pic>
+        <p:nvPicPr>
+          <p:cNvPr id="1026" name="Picture 2"/>
+          <p:cNvPicPr>
+            <a:picLocks noChangeAspect="1" noChangeArrowheads="1"/>
+          </p:cNvPicPr>
+          <p:nvPr/>
+        </p:nvPicPr>
+        <p:blipFill>
+          <a:blip r:embed="rId2">
+            <a:extLst>
+              <a:ext uri="{28A0092B-C50C-407E-A947-70E740481C1C}">
+                <a14:useLocalDpi xmlns:a14="http://schemas.microsoft.com/office/drawing/2010/main" val="0"/>
+              </a:ext>
+            </a:extLst>
+          </a:blip>
+          <a:srcRect/>
+          <a:stretch>
+            <a:fillRect/>
+          </a:stretch>
+        </p:blipFill>
+        <p:spPr bwMode="auto">
+          <a:xfrm>
+            <a:off x="5076056" y="2996952"/>
+            <a:ext cx="3888432" cy="2874059"/>
+          </a:xfrm>
+          <a:prstGeom prst="rect">
+            <a:avLst/>
+          </a:prstGeom>
+          <a:noFill/>
+          <a:ln>
+            <a:noFill/>
+          </a:ln>
+          <a:extLst>
+            <a:ext uri="{909E8E84-426E-40DD-AFC4-6F175D3DCCD1}">
+              <a14:hiddenFill xmlns:a14="http://schemas.microsoft.com/office/drawing/2010/main">
+                <a:solidFill>
+                  <a:schemeClr val="accent1"/>
+                </a:solidFill>
+              </a14:hiddenFill>
+            </a:ext>
+            <a:ext uri="{91240B29-F687-4F45-9708-019B960494DF}">
+              <a14:hiddenLine xmlns:a14="http://schemas.microsoft.com/office/drawing/2010/main" w="9525">
+                <a:solidFill>
+                  <a:schemeClr val="tx1"/>
+                </a:solidFill>
+                <a:miter lim="800000"/>
+                <a:headEnd/>
+                <a:tailEnd/>
+              </a14:hiddenLine>
+            </a:ext>
+          </a:extLst>
+        </p:spPr>
+      </p:pic>
+      <p:sp>
+        <p:nvSpPr>
+          <p:cNvPr id="4" name="テキスト ボックス 3"/>
+          <p:cNvSpPr txBox="1"/>
+          <p:nvPr/>
+        </p:nvSpPr>
+        <p:spPr>
+          <a:xfrm>
+            <a:off x="4368293" y="5923547"/>
+            <a:ext cx="4741426" cy="646331"/>
+          </a:xfrm>
+          <a:prstGeom prst="rect">
+            <a:avLst/>
+          </a:prstGeom>
+          <a:noFill/>
+        </p:spPr>
+        <p:txBody>
+          <a:bodyPr wrap="none" rtlCol="0">
+            <a:spAutoFit/>
+          </a:bodyPr>
+          <a:lstStyle/>
+          <a:p>
+            <a:r>
+              <a:rPr kumimoji="1" lang="en-US" altLang="ja-JP" dirty="0" smtClean="0"/>
+              <a:t>Running </a:t>
+            </a:r>
+            <a:r>
+              <a:rPr kumimoji="1" lang="en-US" altLang="ja-JP" dirty="0" err="1" smtClean="0"/>
+              <a:t>word_counter.R</a:t>
+            </a:r>
+            <a:r>
+              <a:rPr kumimoji="1" lang="en-US" altLang="ja-JP" dirty="0" smtClean="0"/>
+              <a:t> agains</a:t>
+            </a:r>
+            <a:r>
+              <a:rPr lang="en-US" altLang="ja-JP" dirty="0" smtClean="0"/>
+              <a:t>t</a:t>
+            </a:r>
+          </a:p>
+          <a:p>
+            <a:r>
+              <a:rPr lang="en-US" altLang="ja-JP" dirty="0" smtClean="0"/>
+              <a:t>the article </a:t>
+            </a:r>
+            <a:r>
+              <a:rPr kumimoji="1" lang="en-US" altLang="ja-JP" dirty="0" smtClean="0"/>
+              <a:t>‘Genetic algorithm’ from Wikipedia</a:t>
+            </a:r>
+            <a:endParaRPr kumimoji="1" lang="ja-JP" altLang="en-US" dirty="0"/>
+          </a:p>
+        </p:txBody>
+      </p:sp>
     </p:spTree>
     <p:extLst>
       <p:ext uri="{BB962C8B-B14F-4D97-AF65-F5344CB8AC3E}">
@@ -4670,6 +4776,60 @@
           </a:p>
         </p:txBody>
       </p:sp>
+      <p:pic>
+        <p:nvPicPr>
+          <p:cNvPr id="2050" name="Picture 2"/>
+          <p:cNvPicPr>
+            <a:picLocks noChangeAspect="1" noChangeArrowheads="1"/>
+          </p:cNvPicPr>
+          <p:nvPr/>
+        </p:nvPicPr>
+        <p:blipFill>
+          <a:blip r:embed="rId2">
+            <a:extLst>
+              <a:ext uri="{28A0092B-C50C-407E-A947-70E740481C1C}">
+                <a14:useLocalDpi xmlns:a14="http://schemas.microsoft.com/office/drawing/2010/main" val="0"/>
+              </a:ext>
+            </a:extLst>
+          </a:blip>
+          <a:srcRect/>
+          <a:stretch>
+            <a:fillRect/>
+          </a:stretch>
+        </p:blipFill>
+        <p:spPr bwMode="auto">
+          <a:xfrm>
+            <a:off x="107504" y="4797152"/>
+            <a:ext cx="8964488" cy="976330"/>
+          </a:xfrm>
+          <a:prstGeom prst="rect">
+            <a:avLst/>
+          </a:prstGeom>
+          <a:noFill/>
+          <a:ln>
+            <a:noFill/>
+          </a:ln>
+          <a:extLst>
+            <a:ext uri="{909E8E84-426E-40DD-AFC4-6F175D3DCCD1}">
+              <a14:hiddenFill xmlns:a14="http://schemas.microsoft.com/office/drawing/2010/main">
+                <a:solidFill>
+                  <a:schemeClr val="accent1"/>
+                </a:solidFill>
+              </a14:hiddenFill>
+            </a:ext>
+            <a:ext uri="{91240B29-F687-4F45-9708-019B960494DF}">
+              <a14:hiddenLine xmlns:a14="http://schemas.microsoft.com/office/drawing/2010/main" w="9525">
+                <a:solidFill>
+                  <a:schemeClr val="tx1"/>
+                </a:solidFill>
+                <a:miter lim="800000"/>
+                <a:headEnd/>
+                <a:tailEnd/>
+              </a14:hiddenLine>
+            </a:ext>
+          </a:extLst>
+        </p:spPr>
+      </p:pic>
     </p:spTree>
     <p:extLst>
       <p:ext uri="{BB962C8B-B14F-4D97-AF65-F5344CB8AC3E}">

</xml_diff>